<commit_message>
Added home screen and fun screen. Also documented all.
</commit_message>
<xml_diff>
--- a/Documents/AfayaBioDocumentation.pptx
+++ b/Documents/AfayaBioDocumentation.pptx
@@ -23,6 +23,19 @@
     <p:sldId id="273" r:id="rId17"/>
     <p:sldId id="274" r:id="rId18"/>
     <p:sldId id="275" r:id="rId19"/>
+    <p:sldId id="277" r:id="rId20"/>
+    <p:sldId id="276" r:id="rId21"/>
+    <p:sldId id="278" r:id="rId22"/>
+    <p:sldId id="279" r:id="rId23"/>
+    <p:sldId id="281" r:id="rId24"/>
+    <p:sldId id="280" r:id="rId25"/>
+    <p:sldId id="282" r:id="rId26"/>
+    <p:sldId id="283" r:id="rId27"/>
+    <p:sldId id="284" r:id="rId28"/>
+    <p:sldId id="285" r:id="rId29"/>
+    <p:sldId id="286" r:id="rId30"/>
+    <p:sldId id="287" r:id="rId31"/>
+    <p:sldId id="288" r:id="rId32"/>
   </p:sldIdLst>
   <p:sldSz cx="12192000" cy="6858000"/>
   <p:notesSz cx="6858000" cy="9144000"/>
@@ -272,7 +285,7 @@
             <a:fld id="{48A87A34-81AB-432B-8DAE-1953F412C126}" type="datetimeFigureOut">
               <a:rPr lang="en-US" smtClean="0"/>
               <a:pPr/>
-              <a:t>8/4/2018</a:t>
+              <a:t>8/6/2018</a:t>
             </a:fld>
             <a:endParaRPr lang="en-US" dirty="0"/>
           </a:p>
@@ -443,7 +456,7 @@
             <a:fld id="{48A87A34-81AB-432B-8DAE-1953F412C126}" type="datetimeFigureOut">
               <a:rPr lang="en-US" smtClean="0"/>
               <a:pPr/>
-              <a:t>8/4/2018</a:t>
+              <a:t>8/6/2018</a:t>
             </a:fld>
             <a:endParaRPr lang="en-US" dirty="0"/>
           </a:p>
@@ -625,7 +638,7 @@
             <a:fld id="{48A87A34-81AB-432B-8DAE-1953F412C126}" type="datetimeFigureOut">
               <a:rPr lang="en-US" smtClean="0"/>
               <a:pPr/>
-              <a:t>8/4/2018</a:t>
+              <a:t>8/6/2018</a:t>
             </a:fld>
             <a:endParaRPr lang="en-US" dirty="0"/>
           </a:p>
@@ -875,7 +888,7 @@
             <a:fld id="{48A87A34-81AB-432B-8DAE-1953F412C126}" type="datetimeFigureOut">
               <a:rPr lang="en-US" smtClean="0"/>
               <a:pPr/>
-              <a:t>8/4/2018</a:t>
+              <a:t>8/6/2018</a:t>
             </a:fld>
             <a:endParaRPr lang="en-US" dirty="0"/>
           </a:p>
@@ -1047,7 +1060,7 @@
             <a:fld id="{48A87A34-81AB-432B-8DAE-1953F412C126}" type="datetimeFigureOut">
               <a:rPr lang="en-US" smtClean="0"/>
               <a:pPr/>
-              <a:t>8/4/2018</a:t>
+              <a:t>8/6/2018</a:t>
             </a:fld>
             <a:endParaRPr lang="en-US" dirty="0"/>
           </a:p>
@@ -1299,7 +1312,7 @@
           <a:p>
             <a:fld id="{48A87A34-81AB-432B-8DAE-1953F412C126}" type="datetimeFigureOut">
               <a:rPr lang="en-US" smtClean="0"/>
-              <a:t>8/4/2018</a:t>
+              <a:t>8/6/2018</a:t>
             </a:fld>
             <a:endParaRPr lang="en-US" dirty="0"/>
           </a:p>
@@ -1532,7 +1545,7 @@
             <a:fld id="{48A87A34-81AB-432B-8DAE-1953F412C126}" type="datetimeFigureOut">
               <a:rPr lang="en-US" smtClean="0"/>
               <a:pPr/>
-              <a:t>8/4/2018</a:t>
+              <a:t>8/6/2018</a:t>
             </a:fld>
             <a:endParaRPr lang="en-US" dirty="0"/>
           </a:p>
@@ -1881,7 +1894,7 @@
             <a:fld id="{48A87A34-81AB-432B-8DAE-1953F412C126}" type="datetimeFigureOut">
               <a:rPr lang="en-US" smtClean="0"/>
               <a:pPr/>
-              <a:t>8/4/2018</a:t>
+              <a:t>8/6/2018</a:t>
             </a:fld>
             <a:endParaRPr lang="en-US" dirty="0"/>
           </a:p>
@@ -2000,7 +2013,7 @@
           <a:p>
             <a:fld id="{48A87A34-81AB-432B-8DAE-1953F412C126}" type="datetimeFigureOut">
               <a:rPr lang="en-US" smtClean="0"/>
-              <a:t>8/4/2018</a:t>
+              <a:t>8/6/2018</a:t>
             </a:fld>
             <a:endParaRPr lang="en-US" dirty="0"/>
           </a:p>
@@ -2118,7 +2131,7 @@
           <a:p>
             <a:fld id="{48A87A34-81AB-432B-8DAE-1953F412C126}" type="datetimeFigureOut">
               <a:rPr lang="en-US" smtClean="0"/>
-              <a:t>8/4/2018</a:t>
+              <a:t>8/6/2018</a:t>
             </a:fld>
             <a:endParaRPr lang="en-US" dirty="0"/>
           </a:p>
@@ -2403,7 +2416,7 @@
             <a:fld id="{48A87A34-81AB-432B-8DAE-1953F412C126}" type="datetimeFigureOut">
               <a:rPr lang="en-US" smtClean="0"/>
               <a:pPr/>
-              <a:t>8/4/2018</a:t>
+              <a:t>8/6/2018</a:t>
             </a:fld>
             <a:endParaRPr lang="en-US" dirty="0"/>
           </a:p>
@@ -2668,7 +2681,7 @@
           <a:p>
             <a:fld id="{48A87A34-81AB-432B-8DAE-1953F412C126}" type="datetimeFigureOut">
               <a:rPr lang="en-US" smtClean="0"/>
-              <a:t>8/4/2018</a:t>
+              <a:t>8/6/2018</a:t>
             </a:fld>
             <a:endParaRPr lang="en-US" dirty="0"/>
           </a:p>
@@ -2906,7 +2919,7 @@
             <a:fld id="{48A87A34-81AB-432B-8DAE-1953F412C126}" type="datetimeFigureOut">
               <a:rPr lang="en-US" smtClean="0"/>
               <a:pPr/>
-              <a:t>8/4/2018</a:t>
+              <a:t>8/6/2018</a:t>
             </a:fld>
             <a:endParaRPr lang="en-US" dirty="0"/>
           </a:p>
@@ -3869,7 +3882,11 @@
           <a:p>
             <a:r>
               <a:rPr lang="es-ES" b="1" dirty="0"/>
-              <a:t>Página inicial</a:t>
+              <a:t>Hola Mundo + </a:t>
+            </a:r>
+            <a:r>
+              <a:rPr lang="es-ES" b="1" dirty="0" err="1"/>
+              <a:t>routing</a:t>
             </a:r>
             <a:endParaRPr lang="en-IE" b="1" dirty="0"/>
           </a:p>
@@ -5135,6 +5152,89 @@
     <p:extLst>
       <p:ext uri="{BB962C8B-B14F-4D97-AF65-F5344CB8AC3E}">
         <p14:creationId xmlns:p14="http://schemas.microsoft.com/office/powerpoint/2010/main" val="129649846"/>
+      </p:ext>
+    </p:extLst>
+  </p:cSld>
+  <p:clrMapOvr>
+    <a:masterClrMapping/>
+  </p:clrMapOvr>
+</p:sld>
+</file>
+
+<file path=ppt/slides/slide19.xml><?xml version="1.0" encoding="utf-8"?>
+<p:sld xmlns:a="http://schemas.openxmlformats.org/drawingml/2006/main" xmlns:r="http://schemas.openxmlformats.org/officeDocument/2006/relationships" xmlns:p="http://schemas.openxmlformats.org/presentationml/2006/main">
+  <p:cSld>
+    <p:spTree>
+      <p:nvGrpSpPr>
+        <p:cNvPr id="1" name=""/>
+        <p:cNvGrpSpPr/>
+        <p:nvPr/>
+      </p:nvGrpSpPr>
+      <p:grpSpPr>
+        <a:xfrm>
+          <a:off x="0" y="0"/>
+          <a:ext cx="0" cy="0"/>
+          <a:chOff x="0" y="0"/>
+          <a:chExt cx="0" cy="0"/>
+        </a:xfrm>
+      </p:grpSpPr>
+      <p:sp>
+        <p:nvSpPr>
+          <p:cNvPr id="2" name="Título 1">
+            <a:extLst>
+              <a:ext uri="{FF2B5EF4-FFF2-40B4-BE49-F238E27FC236}">
+                <a16:creationId xmlns:a16="http://schemas.microsoft.com/office/drawing/2014/main" id="{201BC7B8-1D9A-4D56-A81A-030D934A3F16}"/>
+              </a:ext>
+            </a:extLst>
+          </p:cNvPr>
+          <p:cNvSpPr txBox="1">
+            <a:spLocks/>
+          </p:cNvSpPr>
+          <p:nvPr/>
+        </p:nvSpPr>
+        <p:spPr>
+          <a:xfrm>
+            <a:off x="594362" y="4365221"/>
+            <a:ext cx="9609668" cy="1468800"/>
+          </a:xfrm>
+          <a:prstGeom prst="rect">
+            <a:avLst/>
+          </a:prstGeom>
+        </p:spPr>
+        <p:txBody>
+          <a:bodyPr/>
+          <a:lstStyle>
+            <a:lvl1pPr algn="l" defTabSz="914400" rtl="0" eaLnBrk="1" latinLnBrk="0" hangingPunct="1">
+              <a:lnSpc>
+                <a:spcPct val="90000"/>
+              </a:lnSpc>
+              <a:spcBef>
+                <a:spcPct val="0"/>
+              </a:spcBef>
+              <a:buNone/>
+              <a:defRPr sz="4400" kern="1200">
+                <a:solidFill>
+                  <a:schemeClr val="tx1"/>
+                </a:solidFill>
+                <a:latin typeface="+mj-lt"/>
+                <a:ea typeface="+mj-ea"/>
+                <a:cs typeface="+mj-cs"/>
+              </a:defRPr>
+            </a:lvl1pPr>
+          </a:lstStyle>
+          <a:p>
+            <a:r>
+              <a:rPr lang="es-ES" b="1" dirty="0"/>
+              <a:t>Página inicial</a:t>
+            </a:r>
+            <a:endParaRPr lang="en-IE" b="1" dirty="0"/>
+          </a:p>
+        </p:txBody>
+      </p:sp>
+    </p:spTree>
+    <p:extLst>
+      <p:ext uri="{BB962C8B-B14F-4D97-AF65-F5344CB8AC3E}">
+        <p14:creationId xmlns:p14="http://schemas.microsoft.com/office/powerpoint/2010/main" val="771225300"/>
       </p:ext>
     </p:extLst>
   </p:cSld>
@@ -6033,6 +6133,1339 @@
 </p:sld>
 </file>
 
+<file path=ppt/slides/slide20.xml><?xml version="1.0" encoding="utf-8"?>
+<p:sld xmlns:a="http://schemas.openxmlformats.org/drawingml/2006/main" xmlns:r="http://schemas.openxmlformats.org/officeDocument/2006/relationships" xmlns:p="http://schemas.openxmlformats.org/presentationml/2006/main">
+  <p:cSld>
+    <p:spTree>
+      <p:nvGrpSpPr>
+        <p:cNvPr id="1" name=""/>
+        <p:cNvGrpSpPr/>
+        <p:nvPr/>
+      </p:nvGrpSpPr>
+      <p:grpSpPr>
+        <a:xfrm>
+          <a:off x="0" y="0"/>
+          <a:ext cx="0" cy="0"/>
+          <a:chOff x="0" y="0"/>
+          <a:chExt cx="0" cy="0"/>
+        </a:xfrm>
+      </p:grpSpPr>
+      <p:pic>
+        <p:nvPicPr>
+          <p:cNvPr id="4" name="Imagen 3">
+            <a:extLst>
+              <a:ext uri="{FF2B5EF4-FFF2-40B4-BE49-F238E27FC236}">
+                <a16:creationId xmlns:a16="http://schemas.microsoft.com/office/drawing/2014/main" id="{0D8A8322-6187-41DD-B747-F04D38A74BDA}"/>
+              </a:ext>
+            </a:extLst>
+          </p:cNvPr>
+          <p:cNvPicPr>
+            <a:picLocks noChangeAspect="1"/>
+          </p:cNvPicPr>
+          <p:nvPr/>
+        </p:nvPicPr>
+        <p:blipFill rotWithShape="1">
+          <a:blip r:embed="rId2"/>
+          <a:srcRect l="909" t="4445" r="758" b="4781"/>
+          <a:stretch/>
+        </p:blipFill>
+        <p:spPr>
+          <a:xfrm>
+            <a:off x="581890" y="453151"/>
+            <a:ext cx="10760363" cy="5587430"/>
+          </a:xfrm>
+          <a:prstGeom prst="rect">
+            <a:avLst/>
+          </a:prstGeom>
+        </p:spPr>
+      </p:pic>
+    </p:spTree>
+    <p:extLst>
+      <p:ext uri="{BB962C8B-B14F-4D97-AF65-F5344CB8AC3E}">
+        <p14:creationId xmlns:p14="http://schemas.microsoft.com/office/powerpoint/2010/main" val="2741575634"/>
+      </p:ext>
+    </p:extLst>
+  </p:cSld>
+  <p:clrMapOvr>
+    <a:masterClrMapping/>
+  </p:clrMapOvr>
+</p:sld>
+</file>
+
+<file path=ppt/slides/slide21.xml><?xml version="1.0" encoding="utf-8"?>
+<p:sld xmlns:a="http://schemas.openxmlformats.org/drawingml/2006/main" xmlns:r="http://schemas.openxmlformats.org/officeDocument/2006/relationships" xmlns:p="http://schemas.openxmlformats.org/presentationml/2006/main">
+  <p:cSld>
+    <p:spTree>
+      <p:nvGrpSpPr>
+        <p:cNvPr id="1" name=""/>
+        <p:cNvGrpSpPr/>
+        <p:nvPr/>
+      </p:nvGrpSpPr>
+      <p:grpSpPr>
+        <a:xfrm>
+          <a:off x="0" y="0"/>
+          <a:ext cx="0" cy="0"/>
+          <a:chOff x="0" y="0"/>
+          <a:chExt cx="0" cy="0"/>
+        </a:xfrm>
+      </p:grpSpPr>
+      <p:pic>
+        <p:nvPicPr>
+          <p:cNvPr id="2" name="Imagen 1">
+            <a:extLst>
+              <a:ext uri="{FF2B5EF4-FFF2-40B4-BE49-F238E27FC236}">
+                <a16:creationId xmlns:a16="http://schemas.microsoft.com/office/drawing/2014/main" id="{74F6E89C-D1F9-4BC2-8941-BB1AE38F10CD}"/>
+              </a:ext>
+            </a:extLst>
+          </p:cNvPr>
+          <p:cNvPicPr>
+            <a:picLocks noChangeAspect="1"/>
+          </p:cNvPicPr>
+          <p:nvPr/>
+        </p:nvPicPr>
+        <p:blipFill>
+          <a:blip r:embed="rId2"/>
+          <a:stretch>
+            <a:fillRect/>
+          </a:stretch>
+        </p:blipFill>
+        <p:spPr>
+          <a:xfrm>
+            <a:off x="614218" y="1327443"/>
+            <a:ext cx="10963564" cy="1134441"/>
+          </a:xfrm>
+          <a:prstGeom prst="rect">
+            <a:avLst/>
+          </a:prstGeom>
+        </p:spPr>
+      </p:pic>
+      <p:pic>
+        <p:nvPicPr>
+          <p:cNvPr id="3" name="Imagen 2">
+            <a:extLst>
+              <a:ext uri="{FF2B5EF4-FFF2-40B4-BE49-F238E27FC236}">
+                <a16:creationId xmlns:a16="http://schemas.microsoft.com/office/drawing/2014/main" id="{E9E344CE-43CA-405F-9146-BF303CB74695}"/>
+              </a:ext>
+            </a:extLst>
+          </p:cNvPr>
+          <p:cNvPicPr>
+            <a:picLocks noChangeAspect="1"/>
+          </p:cNvPicPr>
+          <p:nvPr/>
+        </p:nvPicPr>
+        <p:blipFill>
+          <a:blip r:embed="rId3"/>
+          <a:stretch>
+            <a:fillRect/>
+          </a:stretch>
+        </p:blipFill>
+        <p:spPr>
+          <a:xfrm>
+            <a:off x="665018" y="3520753"/>
+            <a:ext cx="10861963" cy="1713777"/>
+          </a:xfrm>
+          <a:prstGeom prst="rect">
+            <a:avLst/>
+          </a:prstGeom>
+        </p:spPr>
+      </p:pic>
+      <p:sp>
+        <p:nvSpPr>
+          <p:cNvPr id="4" name="CuadroTexto 3">
+            <a:extLst>
+              <a:ext uri="{FF2B5EF4-FFF2-40B4-BE49-F238E27FC236}">
+                <a16:creationId xmlns:a16="http://schemas.microsoft.com/office/drawing/2014/main" id="{D08BA5E9-505B-4A58-A104-B803701FE824}"/>
+              </a:ext>
+            </a:extLst>
+          </p:cNvPr>
+          <p:cNvSpPr txBox="1"/>
+          <p:nvPr/>
+        </p:nvSpPr>
+        <p:spPr>
+          <a:xfrm>
+            <a:off x="665018" y="637309"/>
+            <a:ext cx="3417455" cy="369332"/>
+          </a:xfrm>
+          <a:prstGeom prst="rect">
+            <a:avLst/>
+          </a:prstGeom>
+          <a:noFill/>
+        </p:spPr>
+        <p:txBody>
+          <a:bodyPr wrap="square" rtlCol="0">
+            <a:spAutoFit/>
+          </a:bodyPr>
+          <a:lstStyle/>
+          <a:p>
+            <a:r>
+              <a:rPr lang="es-ES" dirty="0"/>
+              <a:t>Así de simple es el home.html</a:t>
+            </a:r>
+            <a:endParaRPr lang="en-IE" dirty="0"/>
+          </a:p>
+        </p:txBody>
+      </p:sp>
+      <p:sp>
+        <p:nvSpPr>
+          <p:cNvPr id="5" name="CuadroTexto 4">
+            <a:extLst>
+              <a:ext uri="{FF2B5EF4-FFF2-40B4-BE49-F238E27FC236}">
+                <a16:creationId xmlns:a16="http://schemas.microsoft.com/office/drawing/2014/main" id="{895030BF-A029-4091-9B3A-4A124B895D98}"/>
+              </a:ext>
+            </a:extLst>
+          </p:cNvPr>
+          <p:cNvSpPr txBox="1"/>
+          <p:nvPr/>
+        </p:nvSpPr>
+        <p:spPr>
+          <a:xfrm>
+            <a:off x="665018" y="2863273"/>
+            <a:ext cx="3417455" cy="369332"/>
+          </a:xfrm>
+          <a:prstGeom prst="rect">
+            <a:avLst/>
+          </a:prstGeom>
+          <a:noFill/>
+        </p:spPr>
+        <p:txBody>
+          <a:bodyPr wrap="square" rtlCol="0">
+            <a:spAutoFit/>
+          </a:bodyPr>
+          <a:lstStyle/>
+          <a:p>
+            <a:r>
+              <a:rPr lang="es-ES" dirty="0"/>
+              <a:t>Y así el </a:t>
+            </a:r>
+            <a:r>
+              <a:rPr lang="es-ES" dirty="0" err="1"/>
+              <a:t>home.ts</a:t>
+            </a:r>
+            <a:endParaRPr lang="en-IE" dirty="0"/>
+          </a:p>
+        </p:txBody>
+      </p:sp>
+    </p:spTree>
+    <p:extLst>
+      <p:ext uri="{BB962C8B-B14F-4D97-AF65-F5344CB8AC3E}">
+        <p14:creationId xmlns:p14="http://schemas.microsoft.com/office/powerpoint/2010/main" val="2246458085"/>
+      </p:ext>
+    </p:extLst>
+  </p:cSld>
+  <p:clrMapOvr>
+    <a:masterClrMapping/>
+  </p:clrMapOvr>
+</p:sld>
+</file>
+
+<file path=ppt/slides/slide22.xml><?xml version="1.0" encoding="utf-8"?>
+<p:sld xmlns:a="http://schemas.openxmlformats.org/drawingml/2006/main" xmlns:r="http://schemas.openxmlformats.org/officeDocument/2006/relationships" xmlns:p="http://schemas.openxmlformats.org/presentationml/2006/main">
+  <p:cSld>
+    <p:spTree>
+      <p:nvGrpSpPr>
+        <p:cNvPr id="1" name=""/>
+        <p:cNvGrpSpPr/>
+        <p:nvPr/>
+      </p:nvGrpSpPr>
+      <p:grpSpPr>
+        <a:xfrm>
+          <a:off x="0" y="0"/>
+          <a:ext cx="0" cy="0"/>
+          <a:chOff x="0" y="0"/>
+          <a:chExt cx="0" cy="0"/>
+        </a:xfrm>
+      </p:grpSpPr>
+      <p:pic>
+        <p:nvPicPr>
+          <p:cNvPr id="2" name="Imagen 1">
+            <a:extLst>
+              <a:ext uri="{FF2B5EF4-FFF2-40B4-BE49-F238E27FC236}">
+                <a16:creationId xmlns:a16="http://schemas.microsoft.com/office/drawing/2014/main" id="{53228481-1C91-407F-B7B8-9C0643974625}"/>
+              </a:ext>
+            </a:extLst>
+          </p:cNvPr>
+          <p:cNvPicPr>
+            <a:picLocks noChangeAspect="1"/>
+          </p:cNvPicPr>
+          <p:nvPr/>
+        </p:nvPicPr>
+        <p:blipFill>
+          <a:blip r:embed="rId2"/>
+          <a:stretch>
+            <a:fillRect/>
+          </a:stretch>
+        </p:blipFill>
+        <p:spPr>
+          <a:xfrm>
+            <a:off x="295708" y="1256144"/>
+            <a:ext cx="6462131" cy="5345545"/>
+          </a:xfrm>
+          <a:prstGeom prst="rect">
+            <a:avLst/>
+          </a:prstGeom>
+        </p:spPr>
+      </p:pic>
+      <p:pic>
+        <p:nvPicPr>
+          <p:cNvPr id="3" name="Imagen 2">
+            <a:extLst>
+              <a:ext uri="{FF2B5EF4-FFF2-40B4-BE49-F238E27FC236}">
+                <a16:creationId xmlns:a16="http://schemas.microsoft.com/office/drawing/2014/main" id="{4CA36FBD-10F1-49C2-A5A9-623FF7A7058F}"/>
+              </a:ext>
+            </a:extLst>
+          </p:cNvPr>
+          <p:cNvPicPr>
+            <a:picLocks noChangeAspect="1"/>
+          </p:cNvPicPr>
+          <p:nvPr/>
+        </p:nvPicPr>
+        <p:blipFill>
+          <a:blip r:embed="rId3"/>
+          <a:stretch>
+            <a:fillRect/>
+          </a:stretch>
+        </p:blipFill>
+        <p:spPr>
+          <a:xfrm>
+            <a:off x="6978506" y="95250"/>
+            <a:ext cx="4705350" cy="6667500"/>
+          </a:xfrm>
+          <a:prstGeom prst="rect">
+            <a:avLst/>
+          </a:prstGeom>
+        </p:spPr>
+      </p:pic>
+      <p:sp>
+        <p:nvSpPr>
+          <p:cNvPr id="4" name="CuadroTexto 3">
+            <a:extLst>
+              <a:ext uri="{FF2B5EF4-FFF2-40B4-BE49-F238E27FC236}">
+                <a16:creationId xmlns:a16="http://schemas.microsoft.com/office/drawing/2014/main" id="{5E7F319A-3580-460C-B145-0B749BF49441}"/>
+              </a:ext>
+            </a:extLst>
+          </p:cNvPr>
+          <p:cNvSpPr txBox="1"/>
+          <p:nvPr/>
+        </p:nvSpPr>
+        <p:spPr>
+          <a:xfrm>
+            <a:off x="775855" y="295564"/>
+            <a:ext cx="4996872" cy="369332"/>
+          </a:xfrm>
+          <a:prstGeom prst="rect">
+            <a:avLst/>
+          </a:prstGeom>
+          <a:noFill/>
+        </p:spPr>
+        <p:txBody>
+          <a:bodyPr wrap="square" rtlCol="0">
+            <a:spAutoFit/>
+          </a:bodyPr>
+          <a:lstStyle/>
+          <a:p>
+            <a:r>
+              <a:rPr lang="es-ES" dirty="0"/>
+              <a:t>Añado estilos generales y propios</a:t>
+            </a:r>
+            <a:endParaRPr lang="en-IE" dirty="0"/>
+          </a:p>
+        </p:txBody>
+      </p:sp>
+    </p:spTree>
+    <p:extLst>
+      <p:ext uri="{BB962C8B-B14F-4D97-AF65-F5344CB8AC3E}">
+        <p14:creationId xmlns:p14="http://schemas.microsoft.com/office/powerpoint/2010/main" val="3772222497"/>
+      </p:ext>
+    </p:extLst>
+  </p:cSld>
+  <p:clrMapOvr>
+    <a:masterClrMapping/>
+  </p:clrMapOvr>
+</p:sld>
+</file>
+
+<file path=ppt/slides/slide23.xml><?xml version="1.0" encoding="utf-8"?>
+<p:sld xmlns:a="http://schemas.openxmlformats.org/drawingml/2006/main" xmlns:r="http://schemas.openxmlformats.org/officeDocument/2006/relationships" xmlns:p="http://schemas.openxmlformats.org/presentationml/2006/main">
+  <p:cSld>
+    <p:spTree>
+      <p:nvGrpSpPr>
+        <p:cNvPr id="1" name=""/>
+        <p:cNvGrpSpPr/>
+        <p:nvPr/>
+      </p:nvGrpSpPr>
+      <p:grpSpPr>
+        <a:xfrm>
+          <a:off x="0" y="0"/>
+          <a:ext cx="0" cy="0"/>
+          <a:chOff x="0" y="0"/>
+          <a:chExt cx="0" cy="0"/>
+        </a:xfrm>
+      </p:grpSpPr>
+      <p:sp>
+        <p:nvSpPr>
+          <p:cNvPr id="2" name="Título 1">
+            <a:extLst>
+              <a:ext uri="{FF2B5EF4-FFF2-40B4-BE49-F238E27FC236}">
+                <a16:creationId xmlns:a16="http://schemas.microsoft.com/office/drawing/2014/main" id="{201BC7B8-1D9A-4D56-A81A-030D934A3F16}"/>
+              </a:ext>
+            </a:extLst>
+          </p:cNvPr>
+          <p:cNvSpPr txBox="1">
+            <a:spLocks/>
+          </p:cNvSpPr>
+          <p:nvPr/>
+        </p:nvSpPr>
+        <p:spPr>
+          <a:xfrm>
+            <a:off x="594362" y="4365221"/>
+            <a:ext cx="9609668" cy="1468800"/>
+          </a:xfrm>
+          <a:prstGeom prst="rect">
+            <a:avLst/>
+          </a:prstGeom>
+        </p:spPr>
+        <p:txBody>
+          <a:bodyPr/>
+          <a:lstStyle>
+            <a:lvl1pPr algn="l" defTabSz="914400" rtl="0" eaLnBrk="1" latinLnBrk="0" hangingPunct="1">
+              <a:lnSpc>
+                <a:spcPct val="90000"/>
+              </a:lnSpc>
+              <a:spcBef>
+                <a:spcPct val="0"/>
+              </a:spcBef>
+              <a:buNone/>
+              <a:defRPr sz="4400" kern="1200">
+                <a:solidFill>
+                  <a:schemeClr val="tx1"/>
+                </a:solidFill>
+                <a:latin typeface="+mj-lt"/>
+                <a:ea typeface="+mj-ea"/>
+                <a:cs typeface="+mj-cs"/>
+              </a:defRPr>
+            </a:lvl1pPr>
+          </a:lstStyle>
+          <a:p>
+            <a:r>
+              <a:rPr lang="es-ES" b="1" dirty="0"/>
+              <a:t>Página ciencia es divertida</a:t>
+            </a:r>
+            <a:endParaRPr lang="en-IE" b="1" dirty="0"/>
+          </a:p>
+        </p:txBody>
+      </p:sp>
+    </p:spTree>
+    <p:extLst>
+      <p:ext uri="{BB962C8B-B14F-4D97-AF65-F5344CB8AC3E}">
+        <p14:creationId xmlns:p14="http://schemas.microsoft.com/office/powerpoint/2010/main" val="1610063397"/>
+      </p:ext>
+    </p:extLst>
+  </p:cSld>
+  <p:clrMapOvr>
+    <a:masterClrMapping/>
+  </p:clrMapOvr>
+</p:sld>
+</file>
+
+<file path=ppt/slides/slide24.xml><?xml version="1.0" encoding="utf-8"?>
+<p:sld xmlns:a="http://schemas.openxmlformats.org/drawingml/2006/main" xmlns:r="http://schemas.openxmlformats.org/officeDocument/2006/relationships" xmlns:p="http://schemas.openxmlformats.org/presentationml/2006/main">
+  <p:cSld>
+    <p:spTree>
+      <p:nvGrpSpPr>
+        <p:cNvPr id="1" name=""/>
+        <p:cNvGrpSpPr/>
+        <p:nvPr/>
+      </p:nvGrpSpPr>
+      <p:grpSpPr>
+        <a:xfrm>
+          <a:off x="0" y="0"/>
+          <a:ext cx="0" cy="0"/>
+          <a:chOff x="0" y="0"/>
+          <a:chExt cx="0" cy="0"/>
+        </a:xfrm>
+      </p:grpSpPr>
+      <p:pic>
+        <p:nvPicPr>
+          <p:cNvPr id="2" name="Imagen 1">
+            <a:extLst>
+              <a:ext uri="{FF2B5EF4-FFF2-40B4-BE49-F238E27FC236}">
+                <a16:creationId xmlns:a16="http://schemas.microsoft.com/office/drawing/2014/main" id="{F94BDA9C-E9F3-4FC7-9608-5E0A82BA626F}"/>
+              </a:ext>
+            </a:extLst>
+          </p:cNvPr>
+          <p:cNvPicPr>
+            <a:picLocks noChangeAspect="1"/>
+          </p:cNvPicPr>
+          <p:nvPr/>
+        </p:nvPicPr>
+        <p:blipFill rotWithShape="1">
+          <a:blip r:embed="rId2"/>
+          <a:srcRect t="4848" b="4511"/>
+          <a:stretch/>
+        </p:blipFill>
+        <p:spPr>
+          <a:xfrm>
+            <a:off x="208331" y="332508"/>
+            <a:ext cx="11775337" cy="6003637"/>
+          </a:xfrm>
+          <a:prstGeom prst="rect">
+            <a:avLst/>
+          </a:prstGeom>
+        </p:spPr>
+      </p:pic>
+    </p:spTree>
+    <p:extLst>
+      <p:ext uri="{BB962C8B-B14F-4D97-AF65-F5344CB8AC3E}">
+        <p14:creationId xmlns:p14="http://schemas.microsoft.com/office/powerpoint/2010/main" val="2772046755"/>
+      </p:ext>
+    </p:extLst>
+  </p:cSld>
+  <p:clrMapOvr>
+    <a:masterClrMapping/>
+  </p:clrMapOvr>
+</p:sld>
+</file>
+
+<file path=ppt/slides/slide25.xml><?xml version="1.0" encoding="utf-8"?>
+<p:sld xmlns:a="http://schemas.openxmlformats.org/drawingml/2006/main" xmlns:r="http://schemas.openxmlformats.org/officeDocument/2006/relationships" xmlns:p="http://schemas.openxmlformats.org/presentationml/2006/main">
+  <p:cSld>
+    <p:spTree>
+      <p:nvGrpSpPr>
+        <p:cNvPr id="1" name=""/>
+        <p:cNvGrpSpPr/>
+        <p:nvPr/>
+      </p:nvGrpSpPr>
+      <p:grpSpPr>
+        <a:xfrm>
+          <a:off x="0" y="0"/>
+          <a:ext cx="0" cy="0"/>
+          <a:chOff x="0" y="0"/>
+          <a:chExt cx="0" cy="0"/>
+        </a:xfrm>
+      </p:grpSpPr>
+      <p:pic>
+        <p:nvPicPr>
+          <p:cNvPr id="2" name="Imagen 1">
+            <a:extLst>
+              <a:ext uri="{FF2B5EF4-FFF2-40B4-BE49-F238E27FC236}">
+                <a16:creationId xmlns:a16="http://schemas.microsoft.com/office/drawing/2014/main" id="{B2C09E33-477C-40E9-821B-16C2F21C9DC4}"/>
+              </a:ext>
+            </a:extLst>
+          </p:cNvPr>
+          <p:cNvPicPr>
+            <a:picLocks noChangeAspect="1"/>
+          </p:cNvPicPr>
+          <p:nvPr/>
+        </p:nvPicPr>
+        <p:blipFill>
+          <a:blip r:embed="rId2"/>
+          <a:stretch>
+            <a:fillRect/>
+          </a:stretch>
+        </p:blipFill>
+        <p:spPr>
+          <a:xfrm>
+            <a:off x="1076037" y="1462232"/>
+            <a:ext cx="2590800" cy="571500"/>
+          </a:xfrm>
+          <a:prstGeom prst="rect">
+            <a:avLst/>
+          </a:prstGeom>
+        </p:spPr>
+      </p:pic>
+      <p:pic>
+        <p:nvPicPr>
+          <p:cNvPr id="3" name="Imagen 2">
+            <a:extLst>
+              <a:ext uri="{FF2B5EF4-FFF2-40B4-BE49-F238E27FC236}">
+                <a16:creationId xmlns:a16="http://schemas.microsoft.com/office/drawing/2014/main" id="{F8CA6D10-B3A3-4041-8D31-BD47985F29AC}"/>
+              </a:ext>
+            </a:extLst>
+          </p:cNvPr>
+          <p:cNvPicPr>
+            <a:picLocks noChangeAspect="1"/>
+          </p:cNvPicPr>
+          <p:nvPr/>
+        </p:nvPicPr>
+        <p:blipFill>
+          <a:blip r:embed="rId3"/>
+          <a:stretch>
+            <a:fillRect/>
+          </a:stretch>
+        </p:blipFill>
+        <p:spPr>
+          <a:xfrm>
+            <a:off x="2371437" y="2953904"/>
+            <a:ext cx="7096125" cy="3314700"/>
+          </a:xfrm>
+          <a:prstGeom prst="rect">
+            <a:avLst/>
+          </a:prstGeom>
+        </p:spPr>
+      </p:pic>
+      <p:sp>
+        <p:nvSpPr>
+          <p:cNvPr id="4" name="CuadroTexto 3">
+            <a:extLst>
+              <a:ext uri="{FF2B5EF4-FFF2-40B4-BE49-F238E27FC236}">
+                <a16:creationId xmlns:a16="http://schemas.microsoft.com/office/drawing/2014/main" id="{E12555CE-8329-4221-B02A-4C1B2ED0C3D8}"/>
+              </a:ext>
+            </a:extLst>
+          </p:cNvPr>
+          <p:cNvSpPr txBox="1"/>
+          <p:nvPr/>
+        </p:nvSpPr>
+        <p:spPr>
+          <a:xfrm>
+            <a:off x="4230254" y="1202460"/>
+            <a:ext cx="6280727" cy="923330"/>
+          </a:xfrm>
+          <a:prstGeom prst="rect">
+            <a:avLst/>
+          </a:prstGeom>
+          <a:noFill/>
+        </p:spPr>
+        <p:txBody>
+          <a:bodyPr wrap="square" rtlCol="0">
+            <a:spAutoFit/>
+          </a:bodyPr>
+          <a:lstStyle/>
+          <a:p>
+            <a:r>
+              <a:rPr lang="es-ES" dirty="0"/>
+              <a:t>Creo un modelo para los </a:t>
+            </a:r>
+            <a:r>
+              <a:rPr lang="es-ES" dirty="0" err="1"/>
+              <a:t>IgNobel</a:t>
+            </a:r>
+            <a:r>
+              <a:rPr lang="es-ES" dirty="0"/>
+              <a:t> que voy a mostrar en esta página, cuyas propiedades coinciden con las del objeto que me devuelve la </a:t>
+            </a:r>
+            <a:r>
+              <a:rPr lang="es-ES" dirty="0" err="1"/>
+              <a:t>WebApi</a:t>
+            </a:r>
+            <a:r>
+              <a:rPr lang="es-ES" dirty="0"/>
+              <a:t>.</a:t>
+            </a:r>
+            <a:endParaRPr lang="en-IE" dirty="0"/>
+          </a:p>
+        </p:txBody>
+      </p:sp>
+    </p:spTree>
+    <p:extLst>
+      <p:ext uri="{BB962C8B-B14F-4D97-AF65-F5344CB8AC3E}">
+        <p14:creationId xmlns:p14="http://schemas.microsoft.com/office/powerpoint/2010/main" val="4242972708"/>
+      </p:ext>
+    </p:extLst>
+  </p:cSld>
+  <p:clrMapOvr>
+    <a:masterClrMapping/>
+  </p:clrMapOvr>
+</p:sld>
+</file>
+
+<file path=ppt/slides/slide26.xml><?xml version="1.0" encoding="utf-8"?>
+<p:sld xmlns:a="http://schemas.openxmlformats.org/drawingml/2006/main" xmlns:r="http://schemas.openxmlformats.org/officeDocument/2006/relationships" xmlns:p="http://schemas.openxmlformats.org/presentationml/2006/main">
+  <p:cSld>
+    <p:spTree>
+      <p:nvGrpSpPr>
+        <p:cNvPr id="1" name=""/>
+        <p:cNvGrpSpPr/>
+        <p:nvPr/>
+      </p:nvGrpSpPr>
+      <p:grpSpPr>
+        <a:xfrm>
+          <a:off x="0" y="0"/>
+          <a:ext cx="0" cy="0"/>
+          <a:chOff x="0" y="0"/>
+          <a:chExt cx="0" cy="0"/>
+        </a:xfrm>
+      </p:grpSpPr>
+      <p:pic>
+        <p:nvPicPr>
+          <p:cNvPr id="2" name="Imagen 1">
+            <a:extLst>
+              <a:ext uri="{FF2B5EF4-FFF2-40B4-BE49-F238E27FC236}">
+                <a16:creationId xmlns:a16="http://schemas.microsoft.com/office/drawing/2014/main" id="{2AE10A64-63DE-4777-A241-2E1B336078E1}"/>
+              </a:ext>
+            </a:extLst>
+          </p:cNvPr>
+          <p:cNvPicPr>
+            <a:picLocks noChangeAspect="1"/>
+          </p:cNvPicPr>
+          <p:nvPr/>
+        </p:nvPicPr>
+        <p:blipFill>
+          <a:blip r:embed="rId2"/>
+          <a:stretch>
+            <a:fillRect/>
+          </a:stretch>
+        </p:blipFill>
+        <p:spPr>
+          <a:xfrm>
+            <a:off x="207096" y="346075"/>
+            <a:ext cx="2486025" cy="476250"/>
+          </a:xfrm>
+          <a:prstGeom prst="rect">
+            <a:avLst/>
+          </a:prstGeom>
+        </p:spPr>
+      </p:pic>
+      <p:pic>
+        <p:nvPicPr>
+          <p:cNvPr id="3" name="Imagen 2">
+            <a:extLst>
+              <a:ext uri="{FF2B5EF4-FFF2-40B4-BE49-F238E27FC236}">
+                <a16:creationId xmlns:a16="http://schemas.microsoft.com/office/drawing/2014/main" id="{D9F65179-F87B-4759-A73E-2E1DACD3AA23}"/>
+              </a:ext>
+            </a:extLst>
+          </p:cNvPr>
+          <p:cNvPicPr>
+            <a:picLocks noChangeAspect="1"/>
+          </p:cNvPicPr>
+          <p:nvPr/>
+        </p:nvPicPr>
+        <p:blipFill>
+          <a:blip r:embed="rId3"/>
+          <a:stretch>
+            <a:fillRect/>
+          </a:stretch>
+        </p:blipFill>
+        <p:spPr>
+          <a:xfrm>
+            <a:off x="207096" y="1081809"/>
+            <a:ext cx="8915400" cy="4953000"/>
+          </a:xfrm>
+          <a:prstGeom prst="rect">
+            <a:avLst/>
+          </a:prstGeom>
+        </p:spPr>
+      </p:pic>
+      <p:sp>
+        <p:nvSpPr>
+          <p:cNvPr id="4" name="CuadroTexto 3">
+            <a:extLst>
+              <a:ext uri="{FF2B5EF4-FFF2-40B4-BE49-F238E27FC236}">
+                <a16:creationId xmlns:a16="http://schemas.microsoft.com/office/drawing/2014/main" id="{B5B7BA4A-9660-44DC-BE2F-B277FA12E798}"/>
+              </a:ext>
+            </a:extLst>
+          </p:cNvPr>
+          <p:cNvSpPr txBox="1"/>
+          <p:nvPr/>
+        </p:nvSpPr>
+        <p:spPr>
+          <a:xfrm>
+            <a:off x="3796145" y="184727"/>
+            <a:ext cx="6465455" cy="646331"/>
+          </a:xfrm>
+          <a:prstGeom prst="rect">
+            <a:avLst/>
+          </a:prstGeom>
+          <a:noFill/>
+        </p:spPr>
+        <p:txBody>
+          <a:bodyPr wrap="square" rtlCol="0">
+            <a:spAutoFit/>
+          </a:bodyPr>
+          <a:lstStyle/>
+          <a:p>
+            <a:r>
+              <a:rPr lang="es-ES" dirty="0"/>
+              <a:t>Creo una clase </a:t>
+            </a:r>
+            <a:r>
+              <a:rPr lang="es-ES" dirty="0" err="1"/>
+              <a:t>Service</a:t>
+            </a:r>
+            <a:r>
+              <a:rPr lang="es-ES" dirty="0"/>
+              <a:t>, para la lógica que necesito con respecto a los datos provenientes de la </a:t>
+            </a:r>
+            <a:r>
+              <a:rPr lang="es-ES" dirty="0" err="1"/>
+              <a:t>WebAPI</a:t>
+            </a:r>
+            <a:endParaRPr lang="en-IE" dirty="0"/>
+          </a:p>
+        </p:txBody>
+      </p:sp>
+      <p:sp>
+        <p:nvSpPr>
+          <p:cNvPr id="5" name="CuadroTexto 4">
+            <a:extLst>
+              <a:ext uri="{FF2B5EF4-FFF2-40B4-BE49-F238E27FC236}">
+                <a16:creationId xmlns:a16="http://schemas.microsoft.com/office/drawing/2014/main" id="{C0EF0285-3195-497E-A09E-40438EEC44D4}"/>
+              </a:ext>
+            </a:extLst>
+          </p:cNvPr>
+          <p:cNvSpPr txBox="1"/>
+          <p:nvPr/>
+        </p:nvSpPr>
+        <p:spPr>
+          <a:xfrm>
+            <a:off x="9421090" y="2992582"/>
+            <a:ext cx="2318328" cy="1754326"/>
+          </a:xfrm>
+          <a:prstGeom prst="rect">
+            <a:avLst/>
+          </a:prstGeom>
+          <a:noFill/>
+        </p:spPr>
+        <p:txBody>
+          <a:bodyPr wrap="square" rtlCol="0">
+            <a:spAutoFit/>
+          </a:bodyPr>
+          <a:lstStyle/>
+          <a:p>
+            <a:r>
+              <a:rPr lang="es-ES" dirty="0"/>
+              <a:t>Es una llamada asíncrona con una función </a:t>
+            </a:r>
+            <a:r>
+              <a:rPr lang="es-ES" dirty="0" err="1"/>
+              <a:t>callback</a:t>
+            </a:r>
+            <a:r>
+              <a:rPr lang="es-ES" dirty="0"/>
+              <a:t> para que los datos se carguen consecutivamente.</a:t>
+            </a:r>
+            <a:endParaRPr lang="en-IE" dirty="0"/>
+          </a:p>
+        </p:txBody>
+      </p:sp>
+    </p:spTree>
+    <p:extLst>
+      <p:ext uri="{BB962C8B-B14F-4D97-AF65-F5344CB8AC3E}">
+        <p14:creationId xmlns:p14="http://schemas.microsoft.com/office/powerpoint/2010/main" val="542483788"/>
+      </p:ext>
+    </p:extLst>
+  </p:cSld>
+  <p:clrMapOvr>
+    <a:masterClrMapping/>
+  </p:clrMapOvr>
+</p:sld>
+</file>
+
+<file path=ppt/slides/slide27.xml><?xml version="1.0" encoding="utf-8"?>
+<p:sld xmlns:a="http://schemas.openxmlformats.org/drawingml/2006/main" xmlns:r="http://schemas.openxmlformats.org/officeDocument/2006/relationships" xmlns:p="http://schemas.openxmlformats.org/presentationml/2006/main">
+  <p:cSld>
+    <p:spTree>
+      <p:nvGrpSpPr>
+        <p:cNvPr id="1" name=""/>
+        <p:cNvGrpSpPr/>
+        <p:nvPr/>
+      </p:nvGrpSpPr>
+      <p:grpSpPr>
+        <a:xfrm>
+          <a:off x="0" y="0"/>
+          <a:ext cx="0" cy="0"/>
+          <a:chOff x="0" y="0"/>
+          <a:chExt cx="0" cy="0"/>
+        </a:xfrm>
+      </p:grpSpPr>
+      <p:pic>
+        <p:nvPicPr>
+          <p:cNvPr id="2" name="Imagen 1">
+            <a:extLst>
+              <a:ext uri="{FF2B5EF4-FFF2-40B4-BE49-F238E27FC236}">
+                <a16:creationId xmlns:a16="http://schemas.microsoft.com/office/drawing/2014/main" id="{F42D73E8-817F-4AFF-AC36-94EB185A675B}"/>
+              </a:ext>
+            </a:extLst>
+          </p:cNvPr>
+          <p:cNvPicPr>
+            <a:picLocks noChangeAspect="1"/>
+          </p:cNvPicPr>
+          <p:nvPr/>
+        </p:nvPicPr>
+        <p:blipFill>
+          <a:blip r:embed="rId2"/>
+          <a:stretch>
+            <a:fillRect/>
+          </a:stretch>
+        </p:blipFill>
+        <p:spPr>
+          <a:xfrm>
+            <a:off x="712210" y="1276350"/>
+            <a:ext cx="7553325" cy="4305300"/>
+          </a:xfrm>
+          <a:prstGeom prst="rect">
+            <a:avLst/>
+          </a:prstGeom>
+        </p:spPr>
+      </p:pic>
+      <p:sp>
+        <p:nvSpPr>
+          <p:cNvPr id="3" name="CuadroTexto 2">
+            <a:extLst>
+              <a:ext uri="{FF2B5EF4-FFF2-40B4-BE49-F238E27FC236}">
+                <a16:creationId xmlns:a16="http://schemas.microsoft.com/office/drawing/2014/main" id="{BA2A91AD-B589-437F-88F4-B479E96EED00}"/>
+              </a:ext>
+            </a:extLst>
+          </p:cNvPr>
+          <p:cNvSpPr txBox="1"/>
+          <p:nvPr/>
+        </p:nvSpPr>
+        <p:spPr>
+          <a:xfrm>
+            <a:off x="8756071" y="2189019"/>
+            <a:ext cx="2318328" cy="2031325"/>
+          </a:xfrm>
+          <a:prstGeom prst="rect">
+            <a:avLst/>
+          </a:prstGeom>
+          <a:noFill/>
+        </p:spPr>
+        <p:txBody>
+          <a:bodyPr wrap="square" rtlCol="0">
+            <a:spAutoFit/>
+          </a:bodyPr>
+          <a:lstStyle/>
+          <a:p>
+            <a:r>
+              <a:rPr lang="es-ES" dirty="0"/>
+              <a:t>Creo un método que me devuelve un número determinado de </a:t>
+            </a:r>
+            <a:r>
+              <a:rPr lang="es-ES" dirty="0" err="1"/>
+              <a:t>IgNobels</a:t>
+            </a:r>
+            <a:r>
+              <a:rPr lang="es-ES" dirty="0"/>
+              <a:t> al azar, para que cada vez se muestren diferentes por pantalla.</a:t>
+            </a:r>
+            <a:endParaRPr lang="en-IE" dirty="0"/>
+          </a:p>
+        </p:txBody>
+      </p:sp>
+    </p:spTree>
+    <p:extLst>
+      <p:ext uri="{BB962C8B-B14F-4D97-AF65-F5344CB8AC3E}">
+        <p14:creationId xmlns:p14="http://schemas.microsoft.com/office/powerpoint/2010/main" val="2181841917"/>
+      </p:ext>
+    </p:extLst>
+  </p:cSld>
+  <p:clrMapOvr>
+    <a:masterClrMapping/>
+  </p:clrMapOvr>
+</p:sld>
+</file>
+
+<file path=ppt/slides/slide28.xml><?xml version="1.0" encoding="utf-8"?>
+<p:sld xmlns:a="http://schemas.openxmlformats.org/drawingml/2006/main" xmlns:r="http://schemas.openxmlformats.org/officeDocument/2006/relationships" xmlns:p="http://schemas.openxmlformats.org/presentationml/2006/main">
+  <p:cSld>
+    <p:spTree>
+      <p:nvGrpSpPr>
+        <p:cNvPr id="1" name=""/>
+        <p:cNvGrpSpPr/>
+        <p:nvPr/>
+      </p:nvGrpSpPr>
+      <p:grpSpPr>
+        <a:xfrm>
+          <a:off x="0" y="0"/>
+          <a:ext cx="0" cy="0"/>
+          <a:chOff x="0" y="0"/>
+          <a:chExt cx="0" cy="0"/>
+        </a:xfrm>
+      </p:grpSpPr>
+      <p:pic>
+        <p:nvPicPr>
+          <p:cNvPr id="2" name="Imagen 1">
+            <a:extLst>
+              <a:ext uri="{FF2B5EF4-FFF2-40B4-BE49-F238E27FC236}">
+                <a16:creationId xmlns:a16="http://schemas.microsoft.com/office/drawing/2014/main" id="{4DF8CDF7-5E3F-4283-A27D-F23C89F75552}"/>
+              </a:ext>
+            </a:extLst>
+          </p:cNvPr>
+          <p:cNvPicPr>
+            <a:picLocks noChangeAspect="1"/>
+          </p:cNvPicPr>
+          <p:nvPr/>
+        </p:nvPicPr>
+        <p:blipFill>
+          <a:blip r:embed="rId2"/>
+          <a:stretch>
+            <a:fillRect/>
+          </a:stretch>
+        </p:blipFill>
+        <p:spPr>
+          <a:xfrm>
+            <a:off x="1064347" y="3153641"/>
+            <a:ext cx="9305925" cy="2933700"/>
+          </a:xfrm>
+          <a:prstGeom prst="rect">
+            <a:avLst/>
+          </a:prstGeom>
+        </p:spPr>
+      </p:pic>
+      <p:sp>
+        <p:nvSpPr>
+          <p:cNvPr id="3" name="CuadroTexto 2">
+            <a:extLst>
+              <a:ext uri="{FF2B5EF4-FFF2-40B4-BE49-F238E27FC236}">
+                <a16:creationId xmlns:a16="http://schemas.microsoft.com/office/drawing/2014/main" id="{23A5857B-D500-4323-86E1-2AEC86CF6EAF}"/>
+              </a:ext>
+            </a:extLst>
+          </p:cNvPr>
+          <p:cNvSpPr txBox="1"/>
+          <p:nvPr/>
+        </p:nvSpPr>
+        <p:spPr>
+          <a:xfrm>
+            <a:off x="951345" y="508000"/>
+            <a:ext cx="9670473" cy="2031325"/>
+          </a:xfrm>
+          <a:prstGeom prst="rect">
+            <a:avLst/>
+          </a:prstGeom>
+          <a:noFill/>
+        </p:spPr>
+        <p:txBody>
+          <a:bodyPr wrap="square" rtlCol="0">
+            <a:spAutoFit/>
+          </a:bodyPr>
+          <a:lstStyle/>
+          <a:p>
+            <a:r>
+              <a:rPr lang="es-ES" dirty="0"/>
+              <a:t>El fun.html tiene como peculiaridad:</a:t>
+            </a:r>
+          </a:p>
+          <a:p>
+            <a:endParaRPr lang="es-ES" dirty="0"/>
+          </a:p>
+          <a:p>
+            <a:pPr marL="285750" indent="-285750">
+              <a:buFont typeface="Wingdings" panose="05000000000000000000" pitchFamily="2" charset="2"/>
+              <a:buChar char="v"/>
+            </a:pPr>
+            <a:r>
+              <a:rPr lang="es-ES" b="1" dirty="0" err="1"/>
+              <a:t>Show.bind</a:t>
+            </a:r>
+            <a:r>
+              <a:rPr lang="es-ES" b="1" dirty="0"/>
+              <a:t> </a:t>
+            </a:r>
+            <a:r>
+              <a:rPr lang="es-ES" dirty="0"/>
+              <a:t>que permite mostrar u ocultar el contenido con respecto a una variable o a una lógica.</a:t>
+            </a:r>
+          </a:p>
+          <a:p>
+            <a:pPr marL="285750" indent="-285750">
+              <a:buFont typeface="Wingdings" panose="05000000000000000000" pitchFamily="2" charset="2"/>
+              <a:buChar char="v"/>
+            </a:pPr>
+            <a:r>
+              <a:rPr lang="es-ES" b="1" dirty="0" err="1"/>
+              <a:t>Repeat.for</a:t>
+            </a:r>
+            <a:r>
+              <a:rPr lang="es-ES" b="1" dirty="0"/>
+              <a:t>, </a:t>
+            </a:r>
+            <a:r>
+              <a:rPr lang="es-ES" dirty="0"/>
+              <a:t>nos permite introducir elementos </a:t>
+            </a:r>
+            <a:r>
+              <a:rPr lang="es-ES" dirty="0" err="1"/>
+              <a:t>html</a:t>
+            </a:r>
+            <a:r>
+              <a:rPr lang="es-ES" dirty="0"/>
+              <a:t> dentro de un bucle </a:t>
+            </a:r>
+            <a:r>
+              <a:rPr lang="es-ES" dirty="0" err="1"/>
+              <a:t>for</a:t>
+            </a:r>
+            <a:r>
+              <a:rPr lang="es-ES" dirty="0"/>
+              <a:t>, de forma que se crearan tantos como elementos haya en el listado</a:t>
+            </a:r>
+          </a:p>
+          <a:p>
+            <a:pPr marL="285750" indent="-285750">
+              <a:buFont typeface="Wingdings" panose="05000000000000000000" pitchFamily="2" charset="2"/>
+              <a:buChar char="v"/>
+            </a:pPr>
+            <a:r>
+              <a:rPr lang="es-ES" b="1" dirty="0"/>
+              <a:t>${propiedad}, </a:t>
+            </a:r>
+            <a:r>
+              <a:rPr lang="es-ES" dirty="0"/>
+              <a:t>permite vincular bidireccionalmente las propiedades del modelo.</a:t>
+            </a:r>
+          </a:p>
+          <a:p>
+            <a:pPr marL="285750" indent="-285750">
+              <a:buFont typeface="Wingdings" panose="05000000000000000000" pitchFamily="2" charset="2"/>
+              <a:buChar char="v"/>
+            </a:pPr>
+            <a:r>
+              <a:rPr lang="es-ES" b="1" dirty="0" err="1"/>
+              <a:t>Click.delegate</a:t>
+            </a:r>
+            <a:r>
+              <a:rPr lang="es-ES" b="1" dirty="0"/>
+              <a:t> </a:t>
+            </a:r>
+            <a:r>
+              <a:rPr lang="es-ES" dirty="0"/>
+              <a:t>para vincular la acción </a:t>
+            </a:r>
+            <a:r>
+              <a:rPr lang="es-ES" dirty="0" err="1"/>
+              <a:t>click</a:t>
+            </a:r>
+            <a:r>
+              <a:rPr lang="es-ES" dirty="0"/>
+              <a:t> del botón con un método del </a:t>
+            </a:r>
+            <a:r>
+              <a:rPr lang="es-ES" dirty="0" err="1"/>
+              <a:t>fun.ts</a:t>
+            </a:r>
+            <a:endParaRPr lang="en-IE" dirty="0"/>
+          </a:p>
+        </p:txBody>
+      </p:sp>
+    </p:spTree>
+    <p:extLst>
+      <p:ext uri="{BB962C8B-B14F-4D97-AF65-F5344CB8AC3E}">
+        <p14:creationId xmlns:p14="http://schemas.microsoft.com/office/powerpoint/2010/main" val="3430563661"/>
+      </p:ext>
+    </p:extLst>
+  </p:cSld>
+  <p:clrMapOvr>
+    <a:masterClrMapping/>
+  </p:clrMapOvr>
+</p:sld>
+</file>
+
+<file path=ppt/slides/slide29.xml><?xml version="1.0" encoding="utf-8"?>
+<p:sld xmlns:a="http://schemas.openxmlformats.org/drawingml/2006/main" xmlns:r="http://schemas.openxmlformats.org/officeDocument/2006/relationships" xmlns:p="http://schemas.openxmlformats.org/presentationml/2006/main">
+  <p:cSld>
+    <p:spTree>
+      <p:nvGrpSpPr>
+        <p:cNvPr id="1" name=""/>
+        <p:cNvGrpSpPr/>
+        <p:nvPr/>
+      </p:nvGrpSpPr>
+      <p:grpSpPr>
+        <a:xfrm>
+          <a:off x="0" y="0"/>
+          <a:ext cx="0" cy="0"/>
+          <a:chOff x="0" y="0"/>
+          <a:chExt cx="0" cy="0"/>
+        </a:xfrm>
+      </p:grpSpPr>
+      <p:pic>
+        <p:nvPicPr>
+          <p:cNvPr id="2" name="Imagen 1">
+            <a:extLst>
+              <a:ext uri="{FF2B5EF4-FFF2-40B4-BE49-F238E27FC236}">
+                <a16:creationId xmlns:a16="http://schemas.microsoft.com/office/drawing/2014/main" id="{22EC803F-4FE1-41EA-BE8F-288E762260A0}"/>
+              </a:ext>
+            </a:extLst>
+          </p:cNvPr>
+          <p:cNvPicPr>
+            <a:picLocks noChangeAspect="1"/>
+          </p:cNvPicPr>
+          <p:nvPr/>
+        </p:nvPicPr>
+        <p:blipFill>
+          <a:blip r:embed="rId2"/>
+          <a:stretch>
+            <a:fillRect/>
+          </a:stretch>
+        </p:blipFill>
+        <p:spPr>
+          <a:xfrm>
+            <a:off x="374073" y="129885"/>
+            <a:ext cx="5629563" cy="4459287"/>
+          </a:xfrm>
+          <a:prstGeom prst="rect">
+            <a:avLst/>
+          </a:prstGeom>
+        </p:spPr>
+      </p:pic>
+      <p:pic>
+        <p:nvPicPr>
+          <p:cNvPr id="3" name="Imagen 2">
+            <a:extLst>
+              <a:ext uri="{FF2B5EF4-FFF2-40B4-BE49-F238E27FC236}">
+                <a16:creationId xmlns:a16="http://schemas.microsoft.com/office/drawing/2014/main" id="{0FB81622-6F32-45E9-AFF5-EAE28A8CEFE0}"/>
+              </a:ext>
+            </a:extLst>
+          </p:cNvPr>
+          <p:cNvPicPr>
+            <a:picLocks noChangeAspect="1"/>
+          </p:cNvPicPr>
+          <p:nvPr/>
+        </p:nvPicPr>
+        <p:blipFill>
+          <a:blip r:embed="rId3"/>
+          <a:stretch>
+            <a:fillRect/>
+          </a:stretch>
+        </p:blipFill>
+        <p:spPr>
+          <a:xfrm>
+            <a:off x="374073" y="4589172"/>
+            <a:ext cx="8571052" cy="2138943"/>
+          </a:xfrm>
+          <a:prstGeom prst="rect">
+            <a:avLst/>
+          </a:prstGeom>
+        </p:spPr>
+      </p:pic>
+      <p:sp>
+        <p:nvSpPr>
+          <p:cNvPr id="4" name="CuadroTexto 3">
+            <a:extLst>
+              <a:ext uri="{FF2B5EF4-FFF2-40B4-BE49-F238E27FC236}">
+                <a16:creationId xmlns:a16="http://schemas.microsoft.com/office/drawing/2014/main" id="{B9914EDA-76E2-45BB-B8E9-C8607F0FD41E}"/>
+              </a:ext>
+            </a:extLst>
+          </p:cNvPr>
+          <p:cNvSpPr txBox="1"/>
+          <p:nvPr/>
+        </p:nvSpPr>
+        <p:spPr>
+          <a:xfrm>
+            <a:off x="6788727" y="217397"/>
+            <a:ext cx="3953164" cy="4247317"/>
+          </a:xfrm>
+          <a:prstGeom prst="rect">
+            <a:avLst/>
+          </a:prstGeom>
+          <a:noFill/>
+        </p:spPr>
+        <p:txBody>
+          <a:bodyPr wrap="square" rtlCol="0">
+            <a:spAutoFit/>
+          </a:bodyPr>
+          <a:lstStyle/>
+          <a:p>
+            <a:r>
+              <a:rPr lang="es-ES" dirty="0"/>
+              <a:t>El </a:t>
+            </a:r>
+            <a:r>
+              <a:rPr lang="es-ES" dirty="0" err="1"/>
+              <a:t>app.ts</a:t>
+            </a:r>
+            <a:r>
+              <a:rPr lang="es-ES" dirty="0"/>
+              <a:t>  es </a:t>
+            </a:r>
+            <a:r>
+              <a:rPr lang="es-ES" dirty="0" err="1"/>
+              <a:t>typescript</a:t>
+            </a:r>
+            <a:r>
+              <a:rPr lang="es-ES" dirty="0"/>
+              <a:t> simplemente, tengo:</a:t>
+            </a:r>
+          </a:p>
+          <a:p>
+            <a:endParaRPr lang="es-ES" dirty="0"/>
+          </a:p>
+          <a:p>
+            <a:r>
+              <a:rPr lang="es-ES" dirty="0"/>
+              <a:t>El método </a:t>
+            </a:r>
+            <a:r>
+              <a:rPr lang="es-ES" dirty="0" err="1"/>
+              <a:t>getIgNobels</a:t>
+            </a:r>
+            <a:r>
+              <a:rPr lang="es-ES" dirty="0"/>
+              <a:t> que llama al método asíncrono del servicio y en el </a:t>
+            </a:r>
+            <a:r>
+              <a:rPr lang="es-ES" dirty="0" err="1"/>
+              <a:t>callback</a:t>
+            </a:r>
+            <a:r>
+              <a:rPr lang="es-ES" dirty="0"/>
+              <a:t> realiza una llamada al </a:t>
+            </a:r>
+            <a:r>
+              <a:rPr lang="es-ES" dirty="0" err="1"/>
+              <a:t>getRandomIgNobel</a:t>
+            </a:r>
+            <a:r>
+              <a:rPr lang="es-ES" dirty="0"/>
+              <a:t>, para que vaya secuencial.</a:t>
+            </a:r>
+          </a:p>
+          <a:p>
+            <a:endParaRPr lang="es-ES" dirty="0"/>
+          </a:p>
+          <a:p>
+            <a:r>
+              <a:rPr lang="es-ES" dirty="0"/>
+              <a:t>El </a:t>
+            </a:r>
+            <a:r>
+              <a:rPr lang="es-ES" dirty="0" err="1"/>
+              <a:t>getRandomIgNobel</a:t>
+            </a:r>
+            <a:r>
+              <a:rPr lang="es-ES" dirty="0"/>
+              <a:t> llama al método del servicio que devuelve los </a:t>
+            </a:r>
+            <a:r>
+              <a:rPr lang="es-ES" dirty="0" err="1"/>
+              <a:t>igNobel</a:t>
+            </a:r>
+            <a:r>
+              <a:rPr lang="es-ES" dirty="0"/>
+              <a:t> de forma aleatoria.</a:t>
+            </a:r>
+          </a:p>
+          <a:p>
+            <a:endParaRPr lang="es-ES" dirty="0"/>
+          </a:p>
+          <a:p>
+            <a:r>
+              <a:rPr lang="es-ES" dirty="0"/>
+              <a:t>El </a:t>
+            </a:r>
+            <a:r>
+              <a:rPr lang="es-ES" dirty="0" err="1"/>
+              <a:t>moreIgNobel</a:t>
+            </a:r>
+            <a:r>
+              <a:rPr lang="es-ES" dirty="0"/>
+              <a:t> es el método vinculado al botón.</a:t>
+            </a:r>
+            <a:endParaRPr lang="en-IE" dirty="0"/>
+          </a:p>
+        </p:txBody>
+      </p:sp>
+    </p:spTree>
+    <p:extLst>
+      <p:ext uri="{BB962C8B-B14F-4D97-AF65-F5344CB8AC3E}">
+        <p14:creationId xmlns:p14="http://schemas.microsoft.com/office/powerpoint/2010/main" val="1561623765"/>
+      </p:ext>
+    </p:extLst>
+  </p:cSld>
+  <p:clrMapOvr>
+    <a:masterClrMapping/>
+  </p:clrMapOvr>
+</p:sld>
+</file>
+
 <file path=ppt/slides/slide3.xml><?xml version="1.0" encoding="utf-8"?>
 <p:sld xmlns:a="http://schemas.openxmlformats.org/drawingml/2006/main" xmlns:r="http://schemas.openxmlformats.org/officeDocument/2006/relationships" xmlns:p="http://schemas.openxmlformats.org/presentationml/2006/main">
   <p:cSld>
@@ -6083,6 +7516,355 @@
     <p:extLst>
       <p:ext uri="{BB962C8B-B14F-4D97-AF65-F5344CB8AC3E}">
         <p14:creationId xmlns:p14="http://schemas.microsoft.com/office/powerpoint/2010/main" val="1733603969"/>
+      </p:ext>
+    </p:extLst>
+  </p:cSld>
+  <p:clrMapOvr>
+    <a:masterClrMapping/>
+  </p:clrMapOvr>
+</p:sld>
+</file>
+
+<file path=ppt/slides/slide30.xml><?xml version="1.0" encoding="utf-8"?>
+<p:sld xmlns:a="http://schemas.openxmlformats.org/drawingml/2006/main" xmlns:r="http://schemas.openxmlformats.org/officeDocument/2006/relationships" xmlns:p="http://schemas.openxmlformats.org/presentationml/2006/main">
+  <p:cSld>
+    <p:spTree>
+      <p:nvGrpSpPr>
+        <p:cNvPr id="1" name=""/>
+        <p:cNvGrpSpPr/>
+        <p:nvPr/>
+      </p:nvGrpSpPr>
+      <p:grpSpPr>
+        <a:xfrm>
+          <a:off x="0" y="0"/>
+          <a:ext cx="0" cy="0"/>
+          <a:chOff x="0" y="0"/>
+          <a:chExt cx="0" cy="0"/>
+        </a:xfrm>
+      </p:grpSpPr>
+      <p:pic>
+        <p:nvPicPr>
+          <p:cNvPr id="2" name="Imagen 1">
+            <a:extLst>
+              <a:ext uri="{FF2B5EF4-FFF2-40B4-BE49-F238E27FC236}">
+                <a16:creationId xmlns:a16="http://schemas.microsoft.com/office/drawing/2014/main" id="{BACC23CF-E10C-4138-9DEA-7A922AA39DD5}"/>
+              </a:ext>
+            </a:extLst>
+          </p:cNvPr>
+          <p:cNvPicPr>
+            <a:picLocks noChangeAspect="1"/>
+          </p:cNvPicPr>
+          <p:nvPr/>
+        </p:nvPicPr>
+        <p:blipFill>
+          <a:blip r:embed="rId2"/>
+          <a:stretch>
+            <a:fillRect/>
+          </a:stretch>
+        </p:blipFill>
+        <p:spPr>
+          <a:xfrm>
+            <a:off x="866775" y="671080"/>
+            <a:ext cx="5229225" cy="5238750"/>
+          </a:xfrm>
+          <a:prstGeom prst="rect">
+            <a:avLst/>
+          </a:prstGeom>
+        </p:spPr>
+      </p:pic>
+      <p:sp>
+        <p:nvSpPr>
+          <p:cNvPr id="3" name="CuadroTexto 2">
+            <a:extLst>
+              <a:ext uri="{FF2B5EF4-FFF2-40B4-BE49-F238E27FC236}">
+                <a16:creationId xmlns:a16="http://schemas.microsoft.com/office/drawing/2014/main" id="{33CE985C-AA11-4593-8ED1-D4A4C1F793F9}"/>
+              </a:ext>
+            </a:extLst>
+          </p:cNvPr>
+          <p:cNvSpPr txBox="1"/>
+          <p:nvPr/>
+        </p:nvSpPr>
+        <p:spPr>
+          <a:xfrm>
+            <a:off x="6576291" y="5329382"/>
+            <a:ext cx="2872509" cy="646331"/>
+          </a:xfrm>
+          <a:prstGeom prst="rect">
+            <a:avLst/>
+          </a:prstGeom>
+          <a:noFill/>
+        </p:spPr>
+        <p:txBody>
+          <a:bodyPr wrap="square" rtlCol="0">
+            <a:spAutoFit/>
+          </a:bodyPr>
+          <a:lstStyle/>
+          <a:p>
+            <a:r>
+              <a:rPr lang="es-ES" dirty="0"/>
+              <a:t>Y estos son los estilos que he añadido.</a:t>
+            </a:r>
+            <a:endParaRPr lang="en-IE" dirty="0"/>
+          </a:p>
+        </p:txBody>
+      </p:sp>
+    </p:spTree>
+    <p:extLst>
+      <p:ext uri="{BB962C8B-B14F-4D97-AF65-F5344CB8AC3E}">
+        <p14:creationId xmlns:p14="http://schemas.microsoft.com/office/powerpoint/2010/main" val="211946953"/>
+      </p:ext>
+    </p:extLst>
+  </p:cSld>
+  <p:clrMapOvr>
+    <a:masterClrMapping/>
+  </p:clrMapOvr>
+</p:sld>
+</file>
+
+<file path=ppt/slides/slide31.xml><?xml version="1.0" encoding="utf-8"?>
+<p:sld xmlns:a="http://schemas.openxmlformats.org/drawingml/2006/main" xmlns:r="http://schemas.openxmlformats.org/officeDocument/2006/relationships" xmlns:p="http://schemas.openxmlformats.org/presentationml/2006/main">
+  <p:cSld>
+    <p:spTree>
+      <p:nvGrpSpPr>
+        <p:cNvPr id="1" name=""/>
+        <p:cNvGrpSpPr/>
+        <p:nvPr/>
+      </p:nvGrpSpPr>
+      <p:grpSpPr>
+        <a:xfrm>
+          <a:off x="0" y="0"/>
+          <a:ext cx="0" cy="0"/>
+          <a:chOff x="0" y="0"/>
+          <a:chExt cx="0" cy="0"/>
+        </a:xfrm>
+      </p:grpSpPr>
+      <p:sp>
+        <p:nvSpPr>
+          <p:cNvPr id="3" name="CuadroTexto 2">
+            <a:extLst>
+              <a:ext uri="{FF2B5EF4-FFF2-40B4-BE49-F238E27FC236}">
+                <a16:creationId xmlns:a16="http://schemas.microsoft.com/office/drawing/2014/main" id="{3454C8CF-9116-459C-8980-950A4B9547C0}"/>
+              </a:ext>
+            </a:extLst>
+          </p:cNvPr>
+          <p:cNvSpPr txBox="1"/>
+          <p:nvPr/>
+        </p:nvSpPr>
+        <p:spPr>
+          <a:xfrm>
+            <a:off x="572655" y="406400"/>
+            <a:ext cx="11065163" cy="646331"/>
+          </a:xfrm>
+          <a:prstGeom prst="rect">
+            <a:avLst/>
+          </a:prstGeom>
+          <a:noFill/>
+        </p:spPr>
+        <p:txBody>
+          <a:bodyPr wrap="square" rtlCol="0">
+            <a:spAutoFit/>
+          </a:bodyPr>
+          <a:lstStyle/>
+          <a:p>
+            <a:r>
+              <a:rPr lang="es-ES" dirty="0"/>
+              <a:t>Al ejecutar la </a:t>
+            </a:r>
+            <a:r>
+              <a:rPr lang="es-ES" dirty="0" err="1"/>
+              <a:t>WebApi</a:t>
+            </a:r>
+            <a:r>
+              <a:rPr lang="es-ES" dirty="0"/>
+              <a:t> y tratar de conectarme a ella me doy cuenta de que no me deja por problema de CORS. Como la </a:t>
+            </a:r>
+            <a:r>
+              <a:rPr lang="es-ES" dirty="0" err="1"/>
+              <a:t>WebAPi</a:t>
+            </a:r>
+            <a:r>
+              <a:rPr lang="es-ES" dirty="0"/>
+              <a:t> está hecha en </a:t>
+            </a:r>
+            <a:r>
+              <a:rPr lang="es-ES" dirty="0" err="1"/>
+              <a:t>ASP.Net</a:t>
+            </a:r>
+            <a:r>
+              <a:rPr lang="es-ES" dirty="0"/>
+              <a:t> Core, lo que yo hago es modificar en el </a:t>
+            </a:r>
+            <a:r>
+              <a:rPr lang="es-ES" dirty="0" err="1"/>
+              <a:t>app.start</a:t>
+            </a:r>
+            <a:r>
+              <a:rPr lang="es-ES" dirty="0"/>
+              <a:t> los siguientes métodos:</a:t>
+            </a:r>
+            <a:endParaRPr lang="en-IE" dirty="0"/>
+          </a:p>
+        </p:txBody>
+      </p:sp>
+      <p:grpSp>
+        <p:nvGrpSpPr>
+          <p:cNvPr id="6" name="Grupo 5">
+            <a:extLst>
+              <a:ext uri="{FF2B5EF4-FFF2-40B4-BE49-F238E27FC236}">
+                <a16:creationId xmlns:a16="http://schemas.microsoft.com/office/drawing/2014/main" id="{9D3CAC7D-4F66-44B1-BB46-89BCC0AD9484}"/>
+              </a:ext>
+            </a:extLst>
+          </p:cNvPr>
+          <p:cNvGrpSpPr/>
+          <p:nvPr/>
+        </p:nvGrpSpPr>
+        <p:grpSpPr>
+          <a:xfrm>
+            <a:off x="1751302" y="1578263"/>
+            <a:ext cx="7248525" cy="3886200"/>
+            <a:chOff x="1751302" y="1578263"/>
+            <a:chExt cx="7248525" cy="3886200"/>
+          </a:xfrm>
+        </p:grpSpPr>
+        <p:pic>
+          <p:nvPicPr>
+            <p:cNvPr id="2" name="Imagen 1">
+              <a:extLst>
+                <a:ext uri="{FF2B5EF4-FFF2-40B4-BE49-F238E27FC236}">
+                  <a16:creationId xmlns:a16="http://schemas.microsoft.com/office/drawing/2014/main" id="{133A0C76-5A44-43FF-A0EE-6C42BEACF0CA}"/>
+                </a:ext>
+              </a:extLst>
+            </p:cNvPr>
+            <p:cNvPicPr>
+              <a:picLocks noChangeAspect="1"/>
+            </p:cNvPicPr>
+            <p:nvPr/>
+          </p:nvPicPr>
+          <p:blipFill>
+            <a:blip r:embed="rId2"/>
+            <a:stretch>
+              <a:fillRect/>
+            </a:stretch>
+          </p:blipFill>
+          <p:spPr>
+            <a:xfrm>
+              <a:off x="1751302" y="1578263"/>
+              <a:ext cx="7248525" cy="3886200"/>
+            </a:xfrm>
+            <a:prstGeom prst="rect">
+              <a:avLst/>
+            </a:prstGeom>
+          </p:spPr>
+        </p:pic>
+        <p:sp>
+          <p:nvSpPr>
+            <p:cNvPr id="4" name="Rectángulo 3">
+              <a:extLst>
+                <a:ext uri="{FF2B5EF4-FFF2-40B4-BE49-F238E27FC236}">
+                  <a16:creationId xmlns:a16="http://schemas.microsoft.com/office/drawing/2014/main" id="{D187D3DE-7FC7-4CF5-8F9E-2EB46424C1F0}"/>
+                </a:ext>
+              </a:extLst>
+            </p:cNvPr>
+            <p:cNvSpPr/>
+            <p:nvPr/>
+          </p:nvSpPr>
+          <p:spPr>
+            <a:xfrm>
+              <a:off x="2115127" y="2133600"/>
+              <a:ext cx="4572000" cy="1126836"/>
+            </a:xfrm>
+            <a:prstGeom prst="rect">
+              <a:avLst/>
+            </a:prstGeom>
+            <a:noFill/>
+            <a:ln>
+              <a:solidFill>
+                <a:srgbClr val="FF0000"/>
+              </a:solidFill>
+            </a:ln>
+          </p:spPr>
+          <p:style>
+            <a:lnRef idx="2">
+              <a:schemeClr val="accent1">
+                <a:shade val="50000"/>
+              </a:schemeClr>
+            </a:lnRef>
+            <a:fillRef idx="1">
+              <a:schemeClr val="accent1"/>
+            </a:fillRef>
+            <a:effectRef idx="0">
+              <a:schemeClr val="accent1"/>
+            </a:effectRef>
+            <a:fontRef idx="minor">
+              <a:schemeClr val="lt1"/>
+            </a:fontRef>
+          </p:style>
+          <p:txBody>
+            <a:bodyPr rtlCol="0" anchor="ctr"/>
+            <a:lstStyle/>
+            <a:p>
+              <a:pPr algn="ctr"/>
+              <a:endParaRPr lang="en-IE"/>
+            </a:p>
+          </p:txBody>
+        </p:sp>
+        <p:sp>
+          <p:nvSpPr>
+            <p:cNvPr id="5" name="Rectángulo 4">
+              <a:extLst>
+                <a:ext uri="{FF2B5EF4-FFF2-40B4-BE49-F238E27FC236}">
+                  <a16:creationId xmlns:a16="http://schemas.microsoft.com/office/drawing/2014/main" id="{377B899A-B803-4178-A465-1B4D3F71CF87}"/>
+                </a:ext>
+              </a:extLst>
+            </p:cNvPr>
+            <p:cNvSpPr/>
+            <p:nvPr/>
+          </p:nvSpPr>
+          <p:spPr>
+            <a:xfrm>
+              <a:off x="1999672" y="4793672"/>
+              <a:ext cx="4572000" cy="267855"/>
+            </a:xfrm>
+            <a:prstGeom prst="rect">
+              <a:avLst/>
+            </a:prstGeom>
+            <a:noFill/>
+            <a:ln>
+              <a:solidFill>
+                <a:srgbClr val="FF0000"/>
+              </a:solidFill>
+            </a:ln>
+          </p:spPr>
+          <p:style>
+            <a:lnRef idx="2">
+              <a:schemeClr val="accent1">
+                <a:shade val="50000"/>
+              </a:schemeClr>
+            </a:lnRef>
+            <a:fillRef idx="1">
+              <a:schemeClr val="accent1"/>
+            </a:fillRef>
+            <a:effectRef idx="0">
+              <a:schemeClr val="accent1"/>
+            </a:effectRef>
+            <a:fontRef idx="minor">
+              <a:schemeClr val="lt1"/>
+            </a:fontRef>
+          </p:style>
+          <p:txBody>
+            <a:bodyPr rtlCol="0" anchor="ctr"/>
+            <a:lstStyle/>
+            <a:p>
+              <a:pPr algn="ctr"/>
+              <a:endParaRPr lang="en-IE"/>
+            </a:p>
+          </p:txBody>
+        </p:sp>
+      </p:grpSp>
+    </p:spTree>
+    <p:extLst>
+      <p:ext uri="{BB962C8B-B14F-4D97-AF65-F5344CB8AC3E}">
+        <p14:creationId xmlns:p14="http://schemas.microsoft.com/office/powerpoint/2010/main" val="3721201748"/>
       </p:ext>
     </p:extLst>
   </p:cSld>

</xml_diff>